<commit_message>
added screenshots to style quide
</commit_message>
<xml_diff>
--- a/Style Guide.pptx
+++ b/Style Guide.pptx
@@ -6974,44 +6974,66 @@
           </a:p>
         </p:txBody>
       </p:sp>
-      <p:sp>
-        <p:nvSpPr>
-          <p:cNvPr id="85" name="Google Shape;85;p18"/>
-          <p:cNvSpPr txBox="1">
-            <a:spLocks noGrp="1"/>
-          </p:cNvSpPr>
-          <p:nvPr>
-            <p:ph type="body" idx="1"/>
-          </p:nvPr>
-        </p:nvSpPr>
+      <p:pic>
+        <p:nvPicPr>
+          <p:cNvPr id="2" name="Picture 1"/>
+          <p:cNvPicPr>
+            <a:picLocks noChangeAspect="1"/>
+          </p:cNvPicPr>
+          <p:nvPr/>
+        </p:nvPicPr>
+        <p:blipFill>
+          <a:blip r:embed="rId3">
+            <a:extLst>
+              <a:ext uri="{28A0092B-C50C-407E-A947-70E740481C1C}">
+                <a14:useLocalDpi xmlns:a14="http://schemas.microsoft.com/office/drawing/2010/main" val="0"/>
+              </a:ext>
+            </a:extLst>
+          </a:blip>
+          <a:stretch>
+            <a:fillRect/>
+          </a:stretch>
+        </p:blipFill>
         <p:spPr>
           <a:xfrm>
-            <a:off x="311700" y="1152475"/>
-            <a:ext cx="8520600" cy="3416400"/>
+            <a:off x="172529" y="1145439"/>
+            <a:ext cx="6365786" cy="3532235"/>
           </a:xfrm>
           <a:prstGeom prst="rect">
             <a:avLst/>
           </a:prstGeom>
         </p:spPr>
-        <p:txBody>
-          <a:bodyPr spcFirstLastPara="1" wrap="square" lIns="91425" tIns="91425" rIns="91425" bIns="91425" anchor="t" anchorCtr="0">
-            <a:noAutofit/>
-          </a:bodyPr>
-          <a:lstStyle/>
-          <a:p>
-            <a:pPr marL="0" lvl="0" indent="0" algn="l" rtl="0">
-              <a:spcBef>
-                <a:spcPts val="0"/>
-              </a:spcBef>
-              <a:spcAft>
-                <a:spcPts val="1600"/>
-              </a:spcAft>
-              <a:buNone/>
-            </a:pPr>
-            <a:endParaRPr/>
-          </a:p>
-        </p:txBody>
-      </p:sp>
+      </p:pic>
+      <p:pic>
+        <p:nvPicPr>
+          <p:cNvPr id="3" name="Picture 2"/>
+          <p:cNvPicPr>
+            <a:picLocks noChangeAspect="1"/>
+          </p:cNvPicPr>
+          <p:nvPr/>
+        </p:nvPicPr>
+        <p:blipFill>
+          <a:blip r:embed="rId4">
+            <a:extLst>
+              <a:ext uri="{28A0092B-C50C-407E-A947-70E740481C1C}">
+                <a14:useLocalDpi xmlns:a14="http://schemas.microsoft.com/office/drawing/2010/main" val="0"/>
+              </a:ext>
+            </a:extLst>
+          </a:blip>
+          <a:stretch>
+            <a:fillRect/>
+          </a:stretch>
+        </p:blipFill>
+        <p:spPr>
+          <a:xfrm>
+            <a:off x="6616460" y="2229515"/>
+            <a:ext cx="2449902" cy="1364081"/>
+          </a:xfrm>
+          <a:prstGeom prst="rect">
+            <a:avLst/>
+          </a:prstGeom>
+        </p:spPr>
+      </p:pic>
     </p:spTree>
   </p:cSld>
   <p:clrMapOvr>

</xml_diff>